<commit_message>
Modified Presentation and screenshots all done
</commit_message>
<xml_diff>
--- a/Presentation.pptx
+++ b/Presentation.pptx
@@ -13,11 +13,12 @@
     <p:sldId id="261" r:id="rId7"/>
     <p:sldId id="262" r:id="rId8"/>
     <p:sldId id="263" r:id="rId9"/>
-    <p:sldId id="264" r:id="rId10"/>
-    <p:sldId id="265" r:id="rId11"/>
-    <p:sldId id="266" r:id="rId12"/>
-    <p:sldId id="267" r:id="rId13"/>
-    <p:sldId id="268" r:id="rId14"/>
+    <p:sldId id="269" r:id="rId10"/>
+    <p:sldId id="264" r:id="rId11"/>
+    <p:sldId id="265" r:id="rId12"/>
+    <p:sldId id="266" r:id="rId13"/>
+    <p:sldId id="267" r:id="rId14"/>
+    <p:sldId id="268" r:id="rId15"/>
   </p:sldIdLst>
   <p:sldSz cx="12192000" cy="6858000"/>
   <p:notesSz cx="6858000" cy="9144000"/>
@@ -116,6 +117,11 @@
       </a:defRPr>
     </a:lvl9pPr>
   </p:defaultTextStyle>
+  <p:extLst>
+    <p:ext uri="{EFAFB233-063F-42B5-8137-9DF3F51BA10A}">
+      <p15:sldGuideLst xmlns:p15="http://schemas.microsoft.com/office/powerpoint/2012/main"/>
+    </p:ext>
+  </p:extLst>
 </p:presentation>
 </file>
 
@@ -12050,7 +12056,7 @@
           <a:noFill/>
           <a:extLst>
             <a:ext uri="{909E8E84-426E-40dd-AFC4-6F175D3DCCD1}">
-              <a14:hiddenFill xmlns:a14="http://schemas.microsoft.com/office/drawing/2010/main" xmlns="">
+              <a14:hiddenFill xmlns="" xmlns:a14="http://schemas.microsoft.com/office/drawing/2010/main">
                 <a:solidFill>
                   <a:srgbClr val="FFFFFF"/>
                 </a:solidFill>
@@ -12110,7 +12116,7 @@
             </a:ln>
             <a:extLst>
               <a:ext uri="{91240B29-F687-4f45-9708-019B960494DF}">
-                <a14:hiddenLine xmlns:a14="http://schemas.microsoft.com/office/drawing/2010/main" xmlns="" w="9525">
+                <a14:hiddenLine xmlns="" xmlns:a14="http://schemas.microsoft.com/office/drawing/2010/main" w="9525">
                   <a:solidFill>
                     <a:srgbClr val="000000"/>
                   </a:solidFill>
@@ -12200,7 +12206,7 @@
             </a:ln>
             <a:extLst>
               <a:ext uri="{91240B29-F687-4f45-9708-019B960494DF}">
-                <a14:hiddenLine xmlns:a14="http://schemas.microsoft.com/office/drawing/2010/main" xmlns="" w="9525">
+                <a14:hiddenLine xmlns="" xmlns:a14="http://schemas.microsoft.com/office/drawing/2010/main" w="9525">
                   <a:solidFill>
                     <a:srgbClr val="000000"/>
                   </a:solidFill>
@@ -12290,7 +12296,7 @@
             </a:ln>
             <a:extLst>
               <a:ext uri="{91240B29-F687-4f45-9708-019B960494DF}">
-                <a14:hiddenLine xmlns:a14="http://schemas.microsoft.com/office/drawing/2010/main" xmlns="" w="9525">
+                <a14:hiddenLine xmlns="" xmlns:a14="http://schemas.microsoft.com/office/drawing/2010/main" w="9525">
                   <a:solidFill>
                     <a:srgbClr val="000000"/>
                   </a:solidFill>
@@ -12324,7 +12330,7 @@
             </a:ln>
             <a:extLst>
               <a:ext uri="{91240B29-F687-4f45-9708-019B960494DF}">
-                <a14:hiddenLine xmlns:a14="http://schemas.microsoft.com/office/drawing/2010/main" xmlns="" w="9525">
+                <a14:hiddenLine xmlns="" xmlns:a14="http://schemas.microsoft.com/office/drawing/2010/main" w="9525">
                   <a:solidFill>
                     <a:srgbClr val="000000"/>
                   </a:solidFill>
@@ -12414,7 +12420,7 @@
             </a:ln>
             <a:extLst>
               <a:ext uri="{91240B29-F687-4f45-9708-019B960494DF}">
-                <a14:hiddenLine xmlns:a14="http://schemas.microsoft.com/office/drawing/2010/main" xmlns="" w="9525">
+                <a14:hiddenLine xmlns="" xmlns:a14="http://schemas.microsoft.com/office/drawing/2010/main" w="9525">
                   <a:solidFill>
                     <a:srgbClr val="000000"/>
                   </a:solidFill>
@@ -12476,7 +12482,7 @@
             </a:ln>
             <a:extLst>
               <a:ext uri="{91240B29-F687-4f45-9708-019B960494DF}">
-                <a14:hiddenLine xmlns:a14="http://schemas.microsoft.com/office/drawing/2010/main" xmlns="" w="9525">
+                <a14:hiddenLine xmlns="" xmlns:a14="http://schemas.microsoft.com/office/drawing/2010/main" w="9525">
                   <a:solidFill>
                     <a:srgbClr val="000000"/>
                   </a:solidFill>
@@ -12538,7 +12544,7 @@
             </a:ln>
             <a:extLst>
               <a:ext uri="{91240B29-F687-4f45-9708-019B960494DF}">
-                <a14:hiddenLine xmlns:a14="http://schemas.microsoft.com/office/drawing/2010/main" xmlns="" w="9525">
+                <a14:hiddenLine xmlns="" xmlns:a14="http://schemas.microsoft.com/office/drawing/2010/main" w="9525">
                   <a:solidFill>
                     <a:srgbClr val="000000"/>
                   </a:solidFill>
@@ -12628,7 +12634,7 @@
             </a:ln>
             <a:extLst>
               <a:ext uri="{91240B29-F687-4f45-9708-019B960494DF}">
-                <a14:hiddenLine xmlns:a14="http://schemas.microsoft.com/office/drawing/2010/main" xmlns="" w="9525">
+                <a14:hiddenLine xmlns="" xmlns:a14="http://schemas.microsoft.com/office/drawing/2010/main" w="9525">
                   <a:solidFill>
                     <a:srgbClr val="000000"/>
                   </a:solidFill>
@@ -12690,7 +12696,7 @@
             </a:ln>
             <a:extLst>
               <a:ext uri="{91240B29-F687-4f45-9708-019B960494DF}">
-                <a14:hiddenLine xmlns:a14="http://schemas.microsoft.com/office/drawing/2010/main" xmlns="" w="9525">
+                <a14:hiddenLine xmlns="" xmlns:a14="http://schemas.microsoft.com/office/drawing/2010/main" w="9525">
                   <a:solidFill>
                     <a:srgbClr val="000000"/>
                   </a:solidFill>
@@ -12752,7 +12758,7 @@
             </a:ln>
             <a:extLst>
               <a:ext uri="{91240B29-F687-4f45-9708-019B960494DF}">
-                <a14:hiddenLine xmlns:a14="http://schemas.microsoft.com/office/drawing/2010/main" xmlns="" w="9525">
+                <a14:hiddenLine xmlns="" xmlns:a14="http://schemas.microsoft.com/office/drawing/2010/main" w="9525">
                   <a:solidFill>
                     <a:srgbClr val="000000"/>
                   </a:solidFill>
@@ -12842,7 +12848,7 @@
             </a:ln>
             <a:extLst>
               <a:ext uri="{91240B29-F687-4f45-9708-019B960494DF}">
-                <a14:hiddenLine xmlns:a14="http://schemas.microsoft.com/office/drawing/2010/main" xmlns="" w="9525">
+                <a14:hiddenLine xmlns="" xmlns:a14="http://schemas.microsoft.com/office/drawing/2010/main" w="9525">
                   <a:solidFill>
                     <a:srgbClr val="000000"/>
                   </a:solidFill>
@@ -12932,7 +12938,7 @@
             </a:ln>
             <a:extLst>
               <a:ext uri="{91240B29-F687-4f45-9708-019B960494DF}">
-                <a14:hiddenLine xmlns:a14="http://schemas.microsoft.com/office/drawing/2010/main" xmlns="" w="9525">
+                <a14:hiddenLine xmlns="" xmlns:a14="http://schemas.microsoft.com/office/drawing/2010/main" w="9525">
                   <a:solidFill>
                     <a:srgbClr val="000000"/>
                   </a:solidFill>
@@ -12994,7 +13000,7 @@
             </a:ln>
             <a:extLst>
               <a:ext uri="{91240B29-F687-4f45-9708-019B960494DF}">
-                <a14:hiddenLine xmlns:a14="http://schemas.microsoft.com/office/drawing/2010/main" xmlns="" w="9525">
+                <a14:hiddenLine xmlns="" xmlns:a14="http://schemas.microsoft.com/office/drawing/2010/main" w="9525">
                   <a:solidFill>
                     <a:srgbClr val="000000"/>
                   </a:solidFill>
@@ -13104,7 +13110,7 @@
             </a:ln>
             <a:extLst>
               <a:ext uri="{91240B29-F687-4f45-9708-019B960494DF}">
-                <a14:hiddenLine xmlns:a14="http://schemas.microsoft.com/office/drawing/2010/main" xmlns="" w="9525">
+                <a14:hiddenLine xmlns="" xmlns:a14="http://schemas.microsoft.com/office/drawing/2010/main" w="9525">
                   <a:solidFill>
                     <a:srgbClr val="000000"/>
                   </a:solidFill>
@@ -13166,7 +13172,7 @@
             </a:ln>
             <a:extLst>
               <a:ext uri="{91240B29-F687-4f45-9708-019B960494DF}">
-                <a14:hiddenLine xmlns:a14="http://schemas.microsoft.com/office/drawing/2010/main" xmlns="" w="9525">
+                <a14:hiddenLine xmlns="" xmlns:a14="http://schemas.microsoft.com/office/drawing/2010/main" w="9525">
                   <a:solidFill>
                     <a:srgbClr val="000000"/>
                   </a:solidFill>
@@ -13256,7 +13262,7 @@
             </a:ln>
             <a:extLst>
               <a:ext uri="{91240B29-F687-4f45-9708-019B960494DF}">
-                <a14:hiddenLine xmlns:a14="http://schemas.microsoft.com/office/drawing/2010/main" xmlns="" w="9525">
+                <a14:hiddenLine xmlns="" xmlns:a14="http://schemas.microsoft.com/office/drawing/2010/main" w="9525">
                   <a:solidFill>
                     <a:srgbClr val="000000"/>
                   </a:solidFill>
@@ -13346,7 +13352,7 @@
             </a:ln>
             <a:extLst>
               <a:ext uri="{91240B29-F687-4f45-9708-019B960494DF}">
-                <a14:hiddenLine xmlns:a14="http://schemas.microsoft.com/office/drawing/2010/main" xmlns="" w="9525">
+                <a14:hiddenLine xmlns="" xmlns:a14="http://schemas.microsoft.com/office/drawing/2010/main" w="9525">
                   <a:solidFill>
                     <a:srgbClr val="000000"/>
                   </a:solidFill>
@@ -13408,7 +13414,7 @@
             </a:ln>
             <a:extLst>
               <a:ext uri="{91240B29-F687-4f45-9708-019B960494DF}">
-                <a14:hiddenLine xmlns:a14="http://schemas.microsoft.com/office/drawing/2010/main" xmlns="" w="9525">
+                <a14:hiddenLine xmlns="" xmlns:a14="http://schemas.microsoft.com/office/drawing/2010/main" w="9525">
                   <a:solidFill>
                     <a:srgbClr val="000000"/>
                   </a:solidFill>
@@ -13498,7 +13504,7 @@
             </a:ln>
             <a:extLst>
               <a:ext uri="{91240B29-F687-4f45-9708-019B960494DF}">
-                <a14:hiddenLine xmlns:a14="http://schemas.microsoft.com/office/drawing/2010/main" xmlns="" w="9525">
+                <a14:hiddenLine xmlns="" xmlns:a14="http://schemas.microsoft.com/office/drawing/2010/main" w="9525">
                   <a:solidFill>
                     <a:srgbClr val="000000"/>
                   </a:solidFill>
@@ -13588,7 +13594,7 @@
             </a:ln>
             <a:extLst>
               <a:ext uri="{91240B29-F687-4f45-9708-019B960494DF}">
-                <a14:hiddenLine xmlns:a14="http://schemas.microsoft.com/office/drawing/2010/main" xmlns="" w="9525">
+                <a14:hiddenLine xmlns="" xmlns:a14="http://schemas.microsoft.com/office/drawing/2010/main" w="9525">
                   <a:solidFill>
                     <a:srgbClr val="000000"/>
                   </a:solidFill>
@@ -13644,7 +13650,7 @@
             </a:ln>
             <a:extLst>
               <a:ext uri="{91240B29-F687-4f45-9708-019B960494DF}">
-                <a14:hiddenLine xmlns:a14="http://schemas.microsoft.com/office/drawing/2010/main" xmlns="" w="9525">
+                <a14:hiddenLine xmlns="" xmlns:a14="http://schemas.microsoft.com/office/drawing/2010/main" w="9525">
                   <a:solidFill>
                     <a:srgbClr val="000000"/>
                   </a:solidFill>
@@ -13734,7 +13740,7 @@
             </a:ln>
             <a:extLst>
               <a:ext uri="{91240B29-F687-4f45-9708-019B960494DF}">
-                <a14:hiddenLine xmlns:a14="http://schemas.microsoft.com/office/drawing/2010/main" xmlns="" w="9525">
+                <a14:hiddenLine xmlns="" xmlns:a14="http://schemas.microsoft.com/office/drawing/2010/main" w="9525">
                   <a:solidFill>
                     <a:srgbClr val="000000"/>
                   </a:solidFill>
@@ -13790,7 +13796,7 @@
             </a:ln>
             <a:extLst>
               <a:ext uri="{91240B29-F687-4f45-9708-019B960494DF}">
-                <a14:hiddenLine xmlns:a14="http://schemas.microsoft.com/office/drawing/2010/main" xmlns="" w="9525">
+                <a14:hiddenLine xmlns="" xmlns:a14="http://schemas.microsoft.com/office/drawing/2010/main" w="9525">
                   <a:solidFill>
                     <a:srgbClr val="000000"/>
                   </a:solidFill>
@@ -13880,7 +13886,7 @@
             </a:ln>
             <a:extLst>
               <a:ext uri="{91240B29-F687-4f45-9708-019B960494DF}">
-                <a14:hiddenLine xmlns:a14="http://schemas.microsoft.com/office/drawing/2010/main" xmlns="" w="9525">
+                <a14:hiddenLine xmlns="" xmlns:a14="http://schemas.microsoft.com/office/drawing/2010/main" w="9525">
                   <a:solidFill>
                     <a:srgbClr val="000000"/>
                   </a:solidFill>
@@ -13948,7 +13954,7 @@
             </a:ln>
             <a:extLst>
               <a:ext uri="{91240B29-F687-4f45-9708-019B960494DF}">
-                <a14:hiddenLine xmlns:a14="http://schemas.microsoft.com/office/drawing/2010/main" xmlns="" w="9525">
+                <a14:hiddenLine xmlns="" xmlns:a14="http://schemas.microsoft.com/office/drawing/2010/main" w="9525">
                   <a:solidFill>
                     <a:srgbClr val="000000"/>
                   </a:solidFill>
@@ -14038,7 +14044,7 @@
             </a:ln>
             <a:extLst>
               <a:ext uri="{91240B29-F687-4f45-9708-019B960494DF}">
-                <a14:hiddenLine xmlns:a14="http://schemas.microsoft.com/office/drawing/2010/main" xmlns="" w="9525">
+                <a14:hiddenLine xmlns="" xmlns:a14="http://schemas.microsoft.com/office/drawing/2010/main" w="9525">
                   <a:solidFill>
                     <a:srgbClr val="000000"/>
                   </a:solidFill>
@@ -14106,7 +14112,7 @@
             </a:ln>
             <a:extLst>
               <a:ext uri="{91240B29-F687-4f45-9708-019B960494DF}">
-                <a14:hiddenLine xmlns:a14="http://schemas.microsoft.com/office/drawing/2010/main" xmlns="" w="9525">
+                <a14:hiddenLine xmlns="" xmlns:a14="http://schemas.microsoft.com/office/drawing/2010/main" w="9525">
                   <a:solidFill>
                     <a:srgbClr val="000000"/>
                   </a:solidFill>
@@ -14196,7 +14202,7 @@
             </a:ln>
             <a:extLst>
               <a:ext uri="{91240B29-F687-4f45-9708-019B960494DF}">
-                <a14:hiddenLine xmlns:a14="http://schemas.microsoft.com/office/drawing/2010/main" xmlns="" w="9525">
+                <a14:hiddenLine xmlns="" xmlns:a14="http://schemas.microsoft.com/office/drawing/2010/main" w="9525">
                   <a:solidFill>
                     <a:srgbClr val="000000"/>
                   </a:solidFill>
@@ -14230,7 +14236,7 @@
             </a:ln>
             <a:extLst>
               <a:ext uri="{91240B29-F687-4f45-9708-019B960494DF}">
-                <a14:hiddenLine xmlns:a14="http://schemas.microsoft.com/office/drawing/2010/main" xmlns="" w="9525">
+                <a14:hiddenLine xmlns="" xmlns:a14="http://schemas.microsoft.com/office/drawing/2010/main" w="9525">
                   <a:solidFill>
                     <a:srgbClr val="000000"/>
                   </a:solidFill>
@@ -14320,7 +14326,7 @@
             </a:ln>
             <a:extLst>
               <a:ext uri="{91240B29-F687-4f45-9708-019B960494DF}">
-                <a14:hiddenLine xmlns:a14="http://schemas.microsoft.com/office/drawing/2010/main" xmlns="" w="9525">
+                <a14:hiddenLine xmlns="" xmlns:a14="http://schemas.microsoft.com/office/drawing/2010/main" w="9525">
                   <a:solidFill>
                     <a:srgbClr val="000000"/>
                   </a:solidFill>
@@ -14382,7 +14388,7 @@
             </a:ln>
             <a:extLst>
               <a:ext uri="{91240B29-F687-4f45-9708-019B960494DF}">
-                <a14:hiddenLine xmlns:a14="http://schemas.microsoft.com/office/drawing/2010/main" xmlns="" w="9525">
+                <a14:hiddenLine xmlns="" xmlns:a14="http://schemas.microsoft.com/office/drawing/2010/main" w="9525">
                   <a:solidFill>
                     <a:srgbClr val="000000"/>
                   </a:solidFill>
@@ -14444,7 +14450,7 @@
             </a:ln>
             <a:extLst>
               <a:ext uri="{91240B29-F687-4f45-9708-019B960494DF}">
-                <a14:hiddenLine xmlns:a14="http://schemas.microsoft.com/office/drawing/2010/main" xmlns="" w="9525">
+                <a14:hiddenLine xmlns="" xmlns:a14="http://schemas.microsoft.com/office/drawing/2010/main" w="9525">
                   <a:solidFill>
                     <a:srgbClr val="000000"/>
                   </a:solidFill>
@@ -14534,7 +14540,7 @@
             </a:ln>
             <a:extLst>
               <a:ext uri="{91240B29-F687-4f45-9708-019B960494DF}">
-                <a14:hiddenLine xmlns:a14="http://schemas.microsoft.com/office/drawing/2010/main" xmlns="" w="9525">
+                <a14:hiddenLine xmlns="" xmlns:a14="http://schemas.microsoft.com/office/drawing/2010/main" w="9525">
                   <a:solidFill>
                     <a:srgbClr val="000000"/>
                   </a:solidFill>
@@ -14602,7 +14608,7 @@
             </a:ln>
             <a:extLst>
               <a:ext uri="{91240B29-F687-4f45-9708-019B960494DF}">
-                <a14:hiddenLine xmlns:a14="http://schemas.microsoft.com/office/drawing/2010/main" xmlns="" w="9525">
+                <a14:hiddenLine xmlns="" xmlns:a14="http://schemas.microsoft.com/office/drawing/2010/main" w="9525">
                   <a:solidFill>
                     <a:srgbClr val="000000"/>
                   </a:solidFill>
@@ -14664,7 +14670,7 @@
             </a:ln>
             <a:extLst>
               <a:ext uri="{91240B29-F687-4f45-9708-019B960494DF}">
-                <a14:hiddenLine xmlns:a14="http://schemas.microsoft.com/office/drawing/2010/main" xmlns="" w="9525">
+                <a14:hiddenLine xmlns="" xmlns:a14="http://schemas.microsoft.com/office/drawing/2010/main" w="9525">
                   <a:solidFill>
                     <a:srgbClr val="000000"/>
                   </a:solidFill>
@@ -14754,7 +14760,7 @@
             </a:ln>
             <a:extLst>
               <a:ext uri="{91240B29-F687-4f45-9708-019B960494DF}">
-                <a14:hiddenLine xmlns:a14="http://schemas.microsoft.com/office/drawing/2010/main" xmlns="" w="9525">
+                <a14:hiddenLine xmlns="" xmlns:a14="http://schemas.microsoft.com/office/drawing/2010/main" w="9525">
                   <a:solidFill>
                     <a:srgbClr val="000000"/>
                   </a:solidFill>
@@ -14816,7 +14822,7 @@
             </a:ln>
             <a:extLst>
               <a:ext uri="{91240B29-F687-4f45-9708-019B960494DF}">
-                <a14:hiddenLine xmlns:a14="http://schemas.microsoft.com/office/drawing/2010/main" xmlns="" w="9525">
+                <a14:hiddenLine xmlns="" xmlns:a14="http://schemas.microsoft.com/office/drawing/2010/main" w="9525">
                   <a:solidFill>
                     <a:srgbClr val="000000"/>
                   </a:solidFill>
@@ -14906,7 +14912,7 @@
             </a:ln>
             <a:extLst>
               <a:ext uri="{91240B29-F687-4f45-9708-019B960494DF}">
-                <a14:hiddenLine xmlns:a14="http://schemas.microsoft.com/office/drawing/2010/main" xmlns="" w="9525">
+                <a14:hiddenLine xmlns="" xmlns:a14="http://schemas.microsoft.com/office/drawing/2010/main" w="9525">
                   <a:solidFill>
                     <a:srgbClr val="000000"/>
                   </a:solidFill>
@@ -14968,7 +14974,7 @@
             </a:ln>
             <a:extLst>
               <a:ext uri="{91240B29-F687-4f45-9708-019B960494DF}">
-                <a14:hiddenLine xmlns:a14="http://schemas.microsoft.com/office/drawing/2010/main" xmlns="" w="9525">
+                <a14:hiddenLine xmlns="" xmlns:a14="http://schemas.microsoft.com/office/drawing/2010/main" w="9525">
                   <a:solidFill>
                     <a:srgbClr val="000000"/>
                   </a:solidFill>
@@ -15058,7 +15064,7 @@
             </a:ln>
             <a:extLst>
               <a:ext uri="{91240B29-F687-4f45-9708-019B960494DF}">
-                <a14:hiddenLine xmlns:a14="http://schemas.microsoft.com/office/drawing/2010/main" xmlns="" w="9525">
+                <a14:hiddenLine xmlns="" xmlns:a14="http://schemas.microsoft.com/office/drawing/2010/main" w="9525">
                   <a:solidFill>
                     <a:srgbClr val="000000"/>
                   </a:solidFill>
@@ -15092,7 +15098,7 @@
             </a:ln>
             <a:extLst>
               <a:ext uri="{91240B29-F687-4f45-9708-019B960494DF}">
-                <a14:hiddenLine xmlns:a14="http://schemas.microsoft.com/office/drawing/2010/main" xmlns="" w="9525">
+                <a14:hiddenLine xmlns="" xmlns:a14="http://schemas.microsoft.com/office/drawing/2010/main" w="9525">
                   <a:solidFill>
                     <a:srgbClr val="000000"/>
                   </a:solidFill>
@@ -15157,7 +15163,7 @@
             </a:ln>
             <a:extLst>
               <a:ext uri="{91240B29-F687-4f45-9708-019B960494DF}">
-                <a14:hiddenLine xmlns:a14="http://schemas.microsoft.com/office/drawing/2010/main" xmlns="" w="9525">
+                <a14:hiddenLine xmlns="" xmlns:a14="http://schemas.microsoft.com/office/drawing/2010/main" w="9525">
                   <a:solidFill>
                     <a:srgbClr val="000000"/>
                   </a:solidFill>
@@ -15247,7 +15253,7 @@
             </a:ln>
             <a:extLst>
               <a:ext uri="{91240B29-F687-4f45-9708-019B960494DF}">
-                <a14:hiddenLine xmlns:a14="http://schemas.microsoft.com/office/drawing/2010/main" xmlns="" w="9525">
+                <a14:hiddenLine xmlns="" xmlns:a14="http://schemas.microsoft.com/office/drawing/2010/main" w="9525">
                   <a:solidFill>
                     <a:srgbClr val="000000"/>
                   </a:solidFill>
@@ -15309,7 +15315,7 @@
             </a:ln>
             <a:extLst>
               <a:ext uri="{91240B29-F687-4f45-9708-019B960494DF}">
-                <a14:hiddenLine xmlns:a14="http://schemas.microsoft.com/office/drawing/2010/main" xmlns="" w="9525">
+                <a14:hiddenLine xmlns="" xmlns:a14="http://schemas.microsoft.com/office/drawing/2010/main" w="9525">
                   <a:solidFill>
                     <a:srgbClr val="000000"/>
                   </a:solidFill>
@@ -15399,7 +15405,7 @@
             </a:ln>
             <a:extLst>
               <a:ext uri="{91240B29-F687-4f45-9708-019B960494DF}">
-                <a14:hiddenLine xmlns:a14="http://schemas.microsoft.com/office/drawing/2010/main" xmlns="" w="9525">
+                <a14:hiddenLine xmlns="" xmlns:a14="http://schemas.microsoft.com/office/drawing/2010/main" w="9525">
                   <a:solidFill>
                     <a:srgbClr val="000000"/>
                   </a:solidFill>
@@ -15489,7 +15495,7 @@
             </a:ln>
             <a:extLst>
               <a:ext uri="{91240B29-F687-4f45-9708-019B960494DF}">
-                <a14:hiddenLine xmlns:a14="http://schemas.microsoft.com/office/drawing/2010/main" xmlns="" w="9525">
+                <a14:hiddenLine xmlns="" xmlns:a14="http://schemas.microsoft.com/office/drawing/2010/main" w="9525">
                   <a:solidFill>
                     <a:srgbClr val="000000"/>
                   </a:solidFill>
@@ -15554,7 +15560,7 @@
             </a:ln>
             <a:extLst>
               <a:ext uri="{91240B29-F687-4f45-9708-019B960494DF}">
-                <a14:hiddenLine xmlns:a14="http://schemas.microsoft.com/office/drawing/2010/main" xmlns="" w="9525">
+                <a14:hiddenLine xmlns="" xmlns:a14="http://schemas.microsoft.com/office/drawing/2010/main" w="9525">
                   <a:solidFill>
                     <a:srgbClr val="000000"/>
                   </a:solidFill>
@@ -15616,7 +15622,7 @@
             </a:ln>
             <a:extLst>
               <a:ext uri="{91240B29-F687-4f45-9708-019B960494DF}">
-                <a14:hiddenLine xmlns:a14="http://schemas.microsoft.com/office/drawing/2010/main" xmlns="" w="9525">
+                <a14:hiddenLine xmlns="" xmlns:a14="http://schemas.microsoft.com/office/drawing/2010/main" w="9525">
                   <a:solidFill>
                     <a:srgbClr val="000000"/>
                   </a:solidFill>
@@ -15706,7 +15712,7 @@
             </a:ln>
             <a:extLst>
               <a:ext uri="{91240B29-F687-4f45-9708-019B960494DF}">
-                <a14:hiddenLine xmlns:a14="http://schemas.microsoft.com/office/drawing/2010/main" xmlns="" w="9525">
+                <a14:hiddenLine xmlns="" xmlns:a14="http://schemas.microsoft.com/office/drawing/2010/main" w="9525">
                   <a:solidFill>
                     <a:srgbClr val="000000"/>
                   </a:solidFill>
@@ -15796,7 +15802,7 @@
             </a:ln>
             <a:extLst>
               <a:ext uri="{91240B29-F687-4f45-9708-019B960494DF}">
-                <a14:hiddenLine xmlns:a14="http://schemas.microsoft.com/office/drawing/2010/main" xmlns="" w="9525">
+                <a14:hiddenLine xmlns="" xmlns:a14="http://schemas.microsoft.com/office/drawing/2010/main" w="9525">
                   <a:solidFill>
                     <a:srgbClr val="000000"/>
                   </a:solidFill>
@@ -15858,7 +15864,7 @@
             </a:ln>
             <a:extLst>
               <a:ext uri="{91240B29-F687-4f45-9708-019B960494DF}">
-                <a14:hiddenLine xmlns:a14="http://schemas.microsoft.com/office/drawing/2010/main" xmlns="" w="9525">
+                <a14:hiddenLine xmlns="" xmlns:a14="http://schemas.microsoft.com/office/drawing/2010/main" w="9525">
                   <a:solidFill>
                     <a:srgbClr val="000000"/>
                   </a:solidFill>
@@ -15978,7 +15984,7 @@
             </a:ln>
             <a:extLst>
               <a:ext uri="{91240B29-F687-4f45-9708-019B960494DF}">
-                <a14:hiddenLine xmlns:a14="http://schemas.microsoft.com/office/drawing/2010/main" xmlns="" w="9525">
+                <a14:hiddenLine xmlns="" xmlns:a14="http://schemas.microsoft.com/office/drawing/2010/main" w="9525">
                   <a:solidFill>
                     <a:srgbClr val="000000"/>
                   </a:solidFill>
@@ -16046,7 +16052,7 @@
             </a:ln>
             <a:extLst>
               <a:ext uri="{91240B29-F687-4f45-9708-019B960494DF}">
-                <a14:hiddenLine xmlns:a14="http://schemas.microsoft.com/office/drawing/2010/main" xmlns="" w="9525">
+                <a14:hiddenLine xmlns="" xmlns:a14="http://schemas.microsoft.com/office/drawing/2010/main" w="9525">
                   <a:solidFill>
                     <a:srgbClr val="000000"/>
                   </a:solidFill>
@@ -16136,7 +16142,7 @@
             </a:ln>
             <a:extLst>
               <a:ext uri="{91240B29-F687-4f45-9708-019B960494DF}">
-                <a14:hiddenLine xmlns:a14="http://schemas.microsoft.com/office/drawing/2010/main" xmlns="" w="9525">
+                <a14:hiddenLine xmlns="" xmlns:a14="http://schemas.microsoft.com/office/drawing/2010/main" w="9525">
                   <a:solidFill>
                     <a:srgbClr val="000000"/>
                   </a:solidFill>
@@ -16276,7 +16282,7 @@
           <a:p>
             <a:fld id="{359D17A9-14A2-4245-9741-B00D4D9325E9}" type="datetimeFigureOut">
               <a:rPr lang="en-US" smtClean="0"/>
-              <a:t>11/3/2022</a:t>
+              <a:t>11/20/2022</a:t>
             </a:fld>
             <a:endParaRPr lang="en-US"/>
           </a:p>
@@ -16543,7 +16549,7 @@
           <a:p>
             <a:fld id="{359D17A9-14A2-4245-9741-B00D4D9325E9}" type="datetimeFigureOut">
               <a:rPr lang="en-US" smtClean="0"/>
-              <a:t>11/3/2022</a:t>
+              <a:t>11/20/2022</a:t>
             </a:fld>
             <a:endParaRPr lang="en-US"/>
           </a:p>
@@ -16739,7 +16745,7 @@
           <a:p>
             <a:fld id="{359D17A9-14A2-4245-9741-B00D4D9325E9}" type="datetimeFigureOut">
               <a:rPr lang="en-US" smtClean="0"/>
-              <a:t>11/3/2022</a:t>
+              <a:t>11/20/2022</a:t>
             </a:fld>
             <a:endParaRPr lang="en-US"/>
           </a:p>
@@ -17002,7 +17008,7 @@
           <a:p>
             <a:fld id="{359D17A9-14A2-4245-9741-B00D4D9325E9}" type="datetimeFigureOut">
               <a:rPr lang="en-US" smtClean="0"/>
-              <a:t>11/3/2022</a:t>
+              <a:t>11/20/2022</a:t>
             </a:fld>
             <a:endParaRPr lang="en-US"/>
           </a:p>
@@ -17436,7 +17442,7 @@
           <a:p>
             <a:fld id="{359D17A9-14A2-4245-9741-B00D4D9325E9}" type="datetimeFigureOut">
               <a:rPr lang="en-US" smtClean="0"/>
-              <a:t>11/3/2022</a:t>
+              <a:t>11/20/2022</a:t>
             </a:fld>
             <a:endParaRPr lang="en-US"/>
           </a:p>
@@ -17982,7 +17988,7 @@
           <a:p>
             <a:fld id="{359D17A9-14A2-4245-9741-B00D4D9325E9}" type="datetimeFigureOut">
               <a:rPr lang="en-US" smtClean="0"/>
-              <a:t>11/3/2022</a:t>
+              <a:t>11/20/2022</a:t>
             </a:fld>
             <a:endParaRPr lang="en-US"/>
           </a:p>
@@ -18702,7 +18708,7 @@
           <a:p>
             <a:fld id="{359D17A9-14A2-4245-9741-B00D4D9325E9}" type="datetimeFigureOut">
               <a:rPr lang="en-US" smtClean="0"/>
-              <a:t>11/3/2022</a:t>
+              <a:t>11/20/2022</a:t>
             </a:fld>
             <a:endParaRPr lang="en-US"/>
           </a:p>
@@ -18872,7 +18878,7 @@
           <a:p>
             <a:fld id="{359D17A9-14A2-4245-9741-B00D4D9325E9}" type="datetimeFigureOut">
               <a:rPr lang="en-US" smtClean="0"/>
-              <a:t>11/3/2022</a:t>
+              <a:t>11/20/2022</a:t>
             </a:fld>
             <a:endParaRPr lang="en-US"/>
           </a:p>
@@ -19052,7 +19058,7 @@
           <a:p>
             <a:fld id="{359D17A9-14A2-4245-9741-B00D4D9325E9}" type="datetimeFigureOut">
               <a:rPr lang="en-US" smtClean="0"/>
-              <a:t>11/3/2022</a:t>
+              <a:t>11/20/2022</a:t>
             </a:fld>
             <a:endParaRPr lang="en-US"/>
           </a:p>
@@ -19222,7 +19228,7 @@
           <a:p>
             <a:fld id="{359D17A9-14A2-4245-9741-B00D4D9325E9}" type="datetimeFigureOut">
               <a:rPr lang="en-US" smtClean="0"/>
-              <a:t>11/3/2022</a:t>
+              <a:t>11/20/2022</a:t>
             </a:fld>
             <a:endParaRPr lang="en-US"/>
           </a:p>
@@ -19472,7 +19478,7 @@
           <a:p>
             <a:fld id="{359D17A9-14A2-4245-9741-B00D4D9325E9}" type="datetimeFigureOut">
               <a:rPr lang="en-US" smtClean="0"/>
-              <a:t>11/3/2022</a:t>
+              <a:t>11/20/2022</a:t>
             </a:fld>
             <a:endParaRPr lang="en-US"/>
           </a:p>
@@ -19704,7 +19710,7 @@
           <a:p>
             <a:fld id="{359D17A9-14A2-4245-9741-B00D4D9325E9}" type="datetimeFigureOut">
               <a:rPr lang="en-US" smtClean="0"/>
-              <a:t>11/3/2022</a:t>
+              <a:t>11/20/2022</a:t>
             </a:fld>
             <a:endParaRPr lang="en-US"/>
           </a:p>
@@ -20085,7 +20091,7 @@
           <a:p>
             <a:fld id="{359D17A9-14A2-4245-9741-B00D4D9325E9}" type="datetimeFigureOut">
               <a:rPr lang="en-US" smtClean="0"/>
-              <a:t>11/3/2022</a:t>
+              <a:t>11/20/2022</a:t>
             </a:fld>
             <a:endParaRPr lang="en-US"/>
           </a:p>
@@ -20203,7 +20209,7 @@
           <a:p>
             <a:fld id="{359D17A9-14A2-4245-9741-B00D4D9325E9}" type="datetimeFigureOut">
               <a:rPr lang="en-US" smtClean="0"/>
-              <a:t>11/3/2022</a:t>
+              <a:t>11/20/2022</a:t>
             </a:fld>
             <a:endParaRPr lang="en-US"/>
           </a:p>
@@ -20298,7 +20304,7 @@
           <a:p>
             <a:fld id="{359D17A9-14A2-4245-9741-B00D4D9325E9}" type="datetimeFigureOut">
               <a:rPr lang="en-US" smtClean="0"/>
-              <a:t>11/3/2022</a:t>
+              <a:t>11/20/2022</a:t>
             </a:fld>
             <a:endParaRPr lang="en-US"/>
           </a:p>
@@ -20547,7 +20553,7 @@
           <a:p>
             <a:fld id="{359D17A9-14A2-4245-9741-B00D4D9325E9}" type="datetimeFigureOut">
               <a:rPr lang="en-US" smtClean="0"/>
-              <a:t>11/3/2022</a:t>
+              <a:t>11/20/2022</a:t>
             </a:fld>
             <a:endParaRPr lang="en-US"/>
           </a:p>
@@ -20827,7 +20833,7 @@
           <a:p>
             <a:fld id="{359D17A9-14A2-4245-9741-B00D4D9325E9}" type="datetimeFigureOut">
               <a:rPr lang="en-US" smtClean="0"/>
-              <a:t>11/3/2022</a:t>
+              <a:t>11/20/2022</a:t>
             </a:fld>
             <a:endParaRPr lang="en-US"/>
           </a:p>
@@ -20943,7 +20949,7 @@
           <a:noFill/>
           <a:extLst>
             <a:ext uri="{909E8E84-426E-40dd-AFC4-6F175D3DCCD1}">
-              <a14:hiddenFill xmlns:a14="http://schemas.microsoft.com/office/drawing/2010/main" xmlns="">
+              <a14:hiddenFill xmlns="" xmlns:a14="http://schemas.microsoft.com/office/drawing/2010/main">
                 <a:solidFill>
                   <a:srgbClr val="FFFFFF"/>
                 </a:solidFill>
@@ -21017,7 +21023,7 @@
               </a:ln>
               <a:extLst>
                 <a:ext uri="{91240B29-F687-4f45-9708-019B960494DF}">
-                  <a14:hiddenLine xmlns:a14="http://schemas.microsoft.com/office/drawing/2010/main" xmlns="" w="9525">
+                  <a14:hiddenLine xmlns="" xmlns:a14="http://schemas.microsoft.com/office/drawing/2010/main" w="9525">
                     <a:solidFill>
                       <a:srgbClr val="000000"/>
                     </a:solidFill>
@@ -21107,7 +21113,7 @@
               </a:ln>
               <a:extLst>
                 <a:ext uri="{91240B29-F687-4f45-9708-019B960494DF}">
-                  <a14:hiddenLine xmlns:a14="http://schemas.microsoft.com/office/drawing/2010/main" xmlns="" w="9525">
+                  <a14:hiddenLine xmlns="" xmlns:a14="http://schemas.microsoft.com/office/drawing/2010/main" w="9525">
                     <a:solidFill>
                       <a:srgbClr val="000000"/>
                     </a:solidFill>
@@ -21197,7 +21203,7 @@
               </a:ln>
               <a:extLst>
                 <a:ext uri="{91240B29-F687-4f45-9708-019B960494DF}">
-                  <a14:hiddenLine xmlns:a14="http://schemas.microsoft.com/office/drawing/2010/main" xmlns="" w="9525">
+                  <a14:hiddenLine xmlns="" xmlns:a14="http://schemas.microsoft.com/office/drawing/2010/main" w="9525">
                     <a:solidFill>
                       <a:srgbClr val="000000"/>
                     </a:solidFill>
@@ -21259,7 +21265,7 @@
               </a:ln>
               <a:extLst>
                 <a:ext uri="{91240B29-F687-4f45-9708-019B960494DF}">
-                  <a14:hiddenLine xmlns:a14="http://schemas.microsoft.com/office/drawing/2010/main" xmlns="" w="9525">
+                  <a14:hiddenLine xmlns="" xmlns:a14="http://schemas.microsoft.com/office/drawing/2010/main" w="9525">
                     <a:solidFill>
                       <a:srgbClr val="000000"/>
                     </a:solidFill>
@@ -21349,7 +21355,7 @@
               </a:ln>
               <a:extLst>
                 <a:ext uri="{91240B29-F687-4f45-9708-019B960494DF}">
-                  <a14:hiddenLine xmlns:a14="http://schemas.microsoft.com/office/drawing/2010/main" xmlns="" w="9525">
+                  <a14:hiddenLine xmlns="" xmlns:a14="http://schemas.microsoft.com/office/drawing/2010/main" w="9525">
                     <a:solidFill>
                       <a:srgbClr val="000000"/>
                     </a:solidFill>
@@ -21411,7 +21417,7 @@
               </a:ln>
               <a:extLst>
                 <a:ext uri="{91240B29-F687-4f45-9708-019B960494DF}">
-                  <a14:hiddenLine xmlns:a14="http://schemas.microsoft.com/office/drawing/2010/main" xmlns="" w="9525">
+                  <a14:hiddenLine xmlns="" xmlns:a14="http://schemas.microsoft.com/office/drawing/2010/main" w="9525">
                     <a:solidFill>
                       <a:srgbClr val="000000"/>
                     </a:solidFill>
@@ -21473,7 +21479,7 @@
               </a:ln>
               <a:extLst>
                 <a:ext uri="{91240B29-F687-4f45-9708-019B960494DF}">
-                  <a14:hiddenLine xmlns:a14="http://schemas.microsoft.com/office/drawing/2010/main" xmlns="" w="9525">
+                  <a14:hiddenLine xmlns="" xmlns:a14="http://schemas.microsoft.com/office/drawing/2010/main" w="9525">
                     <a:solidFill>
                       <a:srgbClr val="000000"/>
                     </a:solidFill>
@@ -21563,7 +21569,7 @@
               </a:ln>
               <a:extLst>
                 <a:ext uri="{91240B29-F687-4f45-9708-019B960494DF}">
-                  <a14:hiddenLine xmlns:a14="http://schemas.microsoft.com/office/drawing/2010/main" xmlns="" w="9525">
+                  <a14:hiddenLine xmlns="" xmlns:a14="http://schemas.microsoft.com/office/drawing/2010/main" w="9525">
                     <a:solidFill>
                       <a:srgbClr val="000000"/>
                     </a:solidFill>
@@ -21653,7 +21659,7 @@
               </a:ln>
               <a:extLst>
                 <a:ext uri="{91240B29-F687-4f45-9708-019B960494DF}">
-                  <a14:hiddenLine xmlns:a14="http://schemas.microsoft.com/office/drawing/2010/main" xmlns="" w="9525">
+                  <a14:hiddenLine xmlns="" xmlns:a14="http://schemas.microsoft.com/office/drawing/2010/main" w="9525">
                     <a:solidFill>
                       <a:srgbClr val="000000"/>
                     </a:solidFill>
@@ -21715,7 +21721,7 @@
               </a:ln>
               <a:extLst>
                 <a:ext uri="{91240B29-F687-4f45-9708-019B960494DF}">
-                  <a14:hiddenLine xmlns:a14="http://schemas.microsoft.com/office/drawing/2010/main" xmlns="" w="9525">
+                  <a14:hiddenLine xmlns="" xmlns:a14="http://schemas.microsoft.com/office/drawing/2010/main" w="9525">
                     <a:solidFill>
                       <a:srgbClr val="000000"/>
                     </a:solidFill>
@@ -21825,7 +21831,7 @@
               </a:ln>
               <a:extLst>
                 <a:ext uri="{91240B29-F687-4f45-9708-019B960494DF}">
-                  <a14:hiddenLine xmlns:a14="http://schemas.microsoft.com/office/drawing/2010/main" xmlns="" w="9525">
+                  <a14:hiddenLine xmlns="" xmlns:a14="http://schemas.microsoft.com/office/drawing/2010/main" w="9525">
                     <a:solidFill>
                       <a:srgbClr val="000000"/>
                     </a:solidFill>
@@ -21909,7 +21915,7 @@
               </a:ln>
               <a:extLst>
                 <a:ext uri="{91240B29-F687-4f45-9708-019B960494DF}">
-                  <a14:hiddenLine xmlns:a14="http://schemas.microsoft.com/office/drawing/2010/main" xmlns="" w="9525">
+                  <a14:hiddenLine xmlns="" xmlns:a14="http://schemas.microsoft.com/office/drawing/2010/main" w="9525">
                     <a:solidFill>
                       <a:srgbClr val="000000"/>
                     </a:solidFill>
@@ -21971,7 +21977,7 @@
               </a:ln>
               <a:extLst>
                 <a:ext uri="{91240B29-F687-4f45-9708-019B960494DF}">
-                  <a14:hiddenLine xmlns:a14="http://schemas.microsoft.com/office/drawing/2010/main" xmlns="" w="9525">
+                  <a14:hiddenLine xmlns="" xmlns:a14="http://schemas.microsoft.com/office/drawing/2010/main" w="9525">
                     <a:solidFill>
                       <a:srgbClr val="000000"/>
                     </a:solidFill>
@@ -22033,7 +22039,7 @@
               </a:ln>
               <a:extLst>
                 <a:ext uri="{91240B29-F687-4f45-9708-019B960494DF}">
-                  <a14:hiddenLine xmlns:a14="http://schemas.microsoft.com/office/drawing/2010/main" xmlns="" w="9525">
+                  <a14:hiddenLine xmlns="" xmlns:a14="http://schemas.microsoft.com/office/drawing/2010/main" w="9525">
                     <a:solidFill>
                       <a:srgbClr val="000000"/>
                     </a:solidFill>
@@ -22123,7 +22129,7 @@
               </a:ln>
               <a:extLst>
                 <a:ext uri="{91240B29-F687-4f45-9708-019B960494DF}">
-                  <a14:hiddenLine xmlns:a14="http://schemas.microsoft.com/office/drawing/2010/main" xmlns="" w="9525">
+                  <a14:hiddenLine xmlns="" xmlns:a14="http://schemas.microsoft.com/office/drawing/2010/main" w="9525">
                     <a:solidFill>
                       <a:srgbClr val="000000"/>
                     </a:solidFill>
@@ -22157,7 +22163,7 @@
               </a:ln>
               <a:extLst>
                 <a:ext uri="{91240B29-F687-4f45-9708-019B960494DF}">
-                  <a14:hiddenLine xmlns:a14="http://schemas.microsoft.com/office/drawing/2010/main" xmlns="" w="9525">
+                  <a14:hiddenLine xmlns="" xmlns:a14="http://schemas.microsoft.com/office/drawing/2010/main" w="9525">
                     <a:solidFill>
                       <a:srgbClr val="000000"/>
                     </a:solidFill>
@@ -22222,7 +22228,7 @@
               </a:ln>
               <a:extLst>
                 <a:ext uri="{91240B29-F687-4f45-9708-019B960494DF}">
-                  <a14:hiddenLine xmlns:a14="http://schemas.microsoft.com/office/drawing/2010/main" xmlns="" w="9525">
+                  <a14:hiddenLine xmlns="" xmlns:a14="http://schemas.microsoft.com/office/drawing/2010/main" w="9525">
                     <a:solidFill>
                       <a:srgbClr val="000000"/>
                     </a:solidFill>
@@ -22312,7 +22318,7 @@
               </a:ln>
               <a:extLst>
                 <a:ext uri="{91240B29-F687-4f45-9708-019B960494DF}">
-                  <a14:hiddenLine xmlns:a14="http://schemas.microsoft.com/office/drawing/2010/main" xmlns="" w="9525">
+                  <a14:hiddenLine xmlns="" xmlns:a14="http://schemas.microsoft.com/office/drawing/2010/main" w="9525">
                     <a:solidFill>
                       <a:srgbClr val="000000"/>
                     </a:solidFill>
@@ -22374,7 +22380,7 @@
               </a:ln>
               <a:extLst>
                 <a:ext uri="{91240B29-F687-4f45-9708-019B960494DF}">
-                  <a14:hiddenLine xmlns:a14="http://schemas.microsoft.com/office/drawing/2010/main" xmlns="" w="9525">
+                  <a14:hiddenLine xmlns="" xmlns:a14="http://schemas.microsoft.com/office/drawing/2010/main" w="9525">
                     <a:solidFill>
                       <a:srgbClr val="000000"/>
                     </a:solidFill>
@@ -22464,7 +22470,7 @@
               </a:ln>
               <a:extLst>
                 <a:ext uri="{91240B29-F687-4f45-9708-019B960494DF}">
-                  <a14:hiddenLine xmlns:a14="http://schemas.microsoft.com/office/drawing/2010/main" xmlns="" w="9525">
+                  <a14:hiddenLine xmlns="" xmlns:a14="http://schemas.microsoft.com/office/drawing/2010/main" w="9525">
                     <a:solidFill>
                       <a:srgbClr val="000000"/>
                     </a:solidFill>
@@ -22529,7 +22535,7 @@
               </a:ln>
               <a:extLst>
                 <a:ext uri="{91240B29-F687-4f45-9708-019B960494DF}">
-                  <a14:hiddenLine xmlns:a14="http://schemas.microsoft.com/office/drawing/2010/main" xmlns="" w="9525">
+                  <a14:hiddenLine xmlns="" xmlns:a14="http://schemas.microsoft.com/office/drawing/2010/main" w="9525">
                     <a:solidFill>
                       <a:srgbClr val="000000"/>
                     </a:solidFill>
@@ -22591,7 +22597,7 @@
               </a:ln>
               <a:extLst>
                 <a:ext uri="{91240B29-F687-4f45-9708-019B960494DF}">
-                  <a14:hiddenLine xmlns:a14="http://schemas.microsoft.com/office/drawing/2010/main" xmlns="" w="9525">
+                  <a14:hiddenLine xmlns="" xmlns:a14="http://schemas.microsoft.com/office/drawing/2010/main" w="9525">
                     <a:solidFill>
                       <a:srgbClr val="000000"/>
                     </a:solidFill>
@@ -22681,7 +22687,7 @@
               </a:ln>
               <a:extLst>
                 <a:ext uri="{91240B29-F687-4f45-9708-019B960494DF}">
-                  <a14:hiddenLine xmlns:a14="http://schemas.microsoft.com/office/drawing/2010/main" xmlns="" w="9525">
+                  <a14:hiddenLine xmlns="" xmlns:a14="http://schemas.microsoft.com/office/drawing/2010/main" w="9525">
                     <a:solidFill>
                       <a:srgbClr val="000000"/>
                     </a:solidFill>
@@ -22771,7 +22777,7 @@
               </a:ln>
               <a:extLst>
                 <a:ext uri="{91240B29-F687-4f45-9708-019B960494DF}">
-                  <a14:hiddenLine xmlns:a14="http://schemas.microsoft.com/office/drawing/2010/main" xmlns="" w="9525">
+                  <a14:hiddenLine xmlns="" xmlns:a14="http://schemas.microsoft.com/office/drawing/2010/main" w="9525">
                     <a:solidFill>
                       <a:srgbClr val="000000"/>
                     </a:solidFill>
@@ -22836,7 +22842,7 @@
               </a:ln>
               <a:extLst>
                 <a:ext uri="{91240B29-F687-4f45-9708-019B960494DF}">
-                  <a14:hiddenLine xmlns:a14="http://schemas.microsoft.com/office/drawing/2010/main" xmlns="" w="9525">
+                  <a14:hiddenLine xmlns="" xmlns:a14="http://schemas.microsoft.com/office/drawing/2010/main" w="9525">
                     <a:solidFill>
                       <a:srgbClr val="000000"/>
                     </a:solidFill>
@@ -22956,7 +22962,7 @@
               </a:ln>
               <a:extLst>
                 <a:ext uri="{91240B29-F687-4f45-9708-019B960494DF}">
-                  <a14:hiddenLine xmlns:a14="http://schemas.microsoft.com/office/drawing/2010/main" xmlns="" w="9525">
+                  <a14:hiddenLine xmlns="" xmlns:a14="http://schemas.microsoft.com/office/drawing/2010/main" w="9525">
                     <a:solidFill>
                       <a:srgbClr val="000000"/>
                     </a:solidFill>
@@ -23054,7 +23060,7 @@
               </a:ln>
               <a:extLst>
                 <a:ext uri="{91240B29-F687-4f45-9708-019B960494DF}">
-                  <a14:hiddenLine xmlns:a14="http://schemas.microsoft.com/office/drawing/2010/main" xmlns="" w="9525">
+                  <a14:hiddenLine xmlns="" xmlns:a14="http://schemas.microsoft.com/office/drawing/2010/main" w="9525">
                     <a:solidFill>
                       <a:srgbClr val="000000"/>
                     </a:solidFill>
@@ -23169,7 +23175,7 @@
               </a:ln>
               <a:extLst>
                 <a:ext uri="{91240B29-F687-4f45-9708-019B960494DF}">
-                  <a14:hiddenLine xmlns:a14="http://schemas.microsoft.com/office/drawing/2010/main" xmlns="" w="9525">
+                  <a14:hiddenLine xmlns="" xmlns:a14="http://schemas.microsoft.com/office/drawing/2010/main" w="9525">
                     <a:solidFill>
                       <a:srgbClr val="000000"/>
                     </a:solidFill>
@@ -23259,7 +23265,7 @@
               </a:ln>
               <a:extLst>
                 <a:ext uri="{91240B29-F687-4f45-9708-019B960494DF}">
-                  <a14:hiddenLine xmlns:a14="http://schemas.microsoft.com/office/drawing/2010/main" xmlns="" w="9525">
+                  <a14:hiddenLine xmlns="" xmlns:a14="http://schemas.microsoft.com/office/drawing/2010/main" w="9525">
                     <a:solidFill>
                       <a:srgbClr val="000000"/>
                     </a:solidFill>
@@ -23324,7 +23330,7 @@
               </a:ln>
               <a:extLst>
                 <a:ext uri="{91240B29-F687-4f45-9708-019B960494DF}">
-                  <a14:hiddenLine xmlns:a14="http://schemas.microsoft.com/office/drawing/2010/main" xmlns="" w="9525">
+                  <a14:hiddenLine xmlns="" xmlns:a14="http://schemas.microsoft.com/office/drawing/2010/main" w="9525">
                     <a:solidFill>
                       <a:srgbClr val="000000"/>
                     </a:solidFill>
@@ -23414,7 +23420,7 @@
               </a:ln>
               <a:extLst>
                 <a:ext uri="{91240B29-F687-4f45-9708-019B960494DF}">
-                  <a14:hiddenLine xmlns:a14="http://schemas.microsoft.com/office/drawing/2010/main" xmlns="" w="9525">
+                  <a14:hiddenLine xmlns="" xmlns:a14="http://schemas.microsoft.com/office/drawing/2010/main" w="9525">
                     <a:solidFill>
                       <a:srgbClr val="000000"/>
                     </a:solidFill>
@@ -23482,7 +23488,7 @@
               </a:ln>
               <a:extLst>
                 <a:ext uri="{91240B29-F687-4f45-9708-019B960494DF}">
-                  <a14:hiddenLine xmlns:a14="http://schemas.microsoft.com/office/drawing/2010/main" xmlns="" w="9525">
+                  <a14:hiddenLine xmlns="" xmlns:a14="http://schemas.microsoft.com/office/drawing/2010/main" w="9525">
                     <a:solidFill>
                       <a:srgbClr val="000000"/>
                     </a:solidFill>
@@ -23572,7 +23578,7 @@
               </a:ln>
               <a:extLst>
                 <a:ext uri="{91240B29-F687-4f45-9708-019B960494DF}">
-                  <a14:hiddenLine xmlns:a14="http://schemas.microsoft.com/office/drawing/2010/main" xmlns="" w="9525">
+                  <a14:hiddenLine xmlns="" xmlns:a14="http://schemas.microsoft.com/office/drawing/2010/main" w="9525">
                     <a:solidFill>
                       <a:srgbClr val="000000"/>
                     </a:solidFill>
@@ -23640,7 +23646,7 @@
               </a:ln>
               <a:extLst>
                 <a:ext uri="{91240B29-F687-4f45-9708-019B960494DF}">
-                  <a14:hiddenLine xmlns:a14="http://schemas.microsoft.com/office/drawing/2010/main" xmlns="" w="9525">
+                  <a14:hiddenLine xmlns="" xmlns:a14="http://schemas.microsoft.com/office/drawing/2010/main" w="9525">
                     <a:solidFill>
                       <a:srgbClr val="000000"/>
                     </a:solidFill>
@@ -23730,7 +23736,7 @@
               </a:ln>
               <a:extLst>
                 <a:ext uri="{91240B29-F687-4f45-9708-019B960494DF}">
-                  <a14:hiddenLine xmlns:a14="http://schemas.microsoft.com/office/drawing/2010/main" xmlns="" w="9525">
+                  <a14:hiddenLine xmlns="" xmlns:a14="http://schemas.microsoft.com/office/drawing/2010/main" w="9525">
                     <a:solidFill>
                       <a:srgbClr val="000000"/>
                     </a:solidFill>
@@ -23764,7 +23770,7 @@
               </a:ln>
               <a:extLst>
                 <a:ext uri="{91240B29-F687-4f45-9708-019B960494DF}">
-                  <a14:hiddenLine xmlns:a14="http://schemas.microsoft.com/office/drawing/2010/main" xmlns="" w="9525">
+                  <a14:hiddenLine xmlns="" xmlns:a14="http://schemas.microsoft.com/office/drawing/2010/main" w="9525">
                     <a:solidFill>
                       <a:srgbClr val="000000"/>
                     </a:solidFill>
@@ -23904,7 +23910,7 @@
           <a:p>
             <a:fld id="{359D17A9-14A2-4245-9741-B00D4D9325E9}" type="datetimeFigureOut">
               <a:rPr lang="en-US" smtClean="0"/>
-              <a:t>11/3/2022</a:t>
+              <a:t>11/20/2022</a:t>
             </a:fld>
             <a:endParaRPr lang="en-US"/>
           </a:p>
@@ -24510,6 +24516,102 @@
             <p:ph idx="1"/>
             <p:extLst>
               <p:ext uri="{D42A27DB-BD31-4B8C-83A1-F6EECF244321}">
+                <p14:modId xmlns:p14="http://schemas.microsoft.com/office/powerpoint/2010/main" val="3781495727"/>
+              </p:ext>
+            </p:extLst>
+          </p:nvPr>
+        </p:nvGraphicFramePr>
+        <p:xfrm>
+          <a:off x="1141413" y="2249488"/>
+          <a:ext cx="9906000" cy="3541712"/>
+        </p:xfrm>
+        <a:graphic>
+          <a:graphicData uri="http://schemas.openxmlformats.org/drawingml/2006/diagram">
+            <dgm:relIds xmlns:dgm="http://schemas.openxmlformats.org/drawingml/2006/diagram" xmlns:r="http://schemas.openxmlformats.org/officeDocument/2006/relationships" r:dm="rId2" r:lo="rId3" r:qs="rId4" r:cs="rId5"/>
+          </a:graphicData>
+        </a:graphic>
+      </p:graphicFrame>
+    </p:spTree>
+    <p:extLst>
+      <p:ext uri="{BB962C8B-B14F-4D97-AF65-F5344CB8AC3E}">
+        <p14:creationId xmlns:p14="http://schemas.microsoft.com/office/powerpoint/2010/main" val="219284453"/>
+      </p:ext>
+    </p:extLst>
+  </p:cSld>
+  <p:clrMapOvr>
+    <a:masterClrMapping/>
+  </p:clrMapOvr>
+</p:sld>
+</file>
+
+<file path=ppt/slides/slide11.xml><?xml version="1.0" encoding="utf-8"?>
+<p:sld xmlns:a="http://schemas.openxmlformats.org/drawingml/2006/main" xmlns:r="http://schemas.openxmlformats.org/officeDocument/2006/relationships" xmlns:p="http://schemas.openxmlformats.org/presentationml/2006/main">
+  <p:cSld>
+    <p:spTree>
+      <p:nvGrpSpPr>
+        <p:cNvPr id="1" name=""/>
+        <p:cNvGrpSpPr/>
+        <p:nvPr/>
+      </p:nvGrpSpPr>
+      <p:grpSpPr>
+        <a:xfrm>
+          <a:off x="0" y="0"/>
+          <a:ext cx="0" cy="0"/>
+          <a:chOff x="0" y="0"/>
+          <a:chExt cx="0" cy="0"/>
+        </a:xfrm>
+      </p:grpSpPr>
+      <p:sp>
+        <p:nvSpPr>
+          <p:cNvPr id="2" name="Title 1">
+            <a:extLst>
+              <a:ext uri="{FF2B5EF4-FFF2-40B4-BE49-F238E27FC236}">
+                <a16:creationId xmlns:a16="http://schemas.microsoft.com/office/drawing/2014/main" id="{953199C9-EE98-4249-2B50-08FDF69E3431}"/>
+              </a:ext>
+            </a:extLst>
+          </p:cNvPr>
+          <p:cNvSpPr>
+            <a:spLocks noGrp="1"/>
+          </p:cNvSpPr>
+          <p:nvPr>
+            <p:ph type="title"/>
+          </p:nvPr>
+        </p:nvSpPr>
+        <p:spPr>
+          <a:xfrm>
+            <a:off x="1141413" y="618518"/>
+            <a:ext cx="9905998" cy="790557"/>
+          </a:xfrm>
+        </p:spPr>
+        <p:txBody>
+          <a:bodyPr>
+            <a:normAutofit fontScale="90000"/>
+          </a:bodyPr>
+          <a:lstStyle/>
+          <a:p>
+            <a:r>
+              <a:rPr lang="en-US" dirty="0"/>
+              <a:t>Confronted challenges with automation Powers.</a:t>
+            </a:r>
+          </a:p>
+        </p:txBody>
+      </p:sp>
+      <p:graphicFrame>
+        <p:nvGraphicFramePr>
+          <p:cNvPr id="4" name="Content Placeholder 3">
+            <a:extLst>
+              <a:ext uri="{FF2B5EF4-FFF2-40B4-BE49-F238E27FC236}">
+                <a16:creationId xmlns:a16="http://schemas.microsoft.com/office/drawing/2014/main" id="{1D5C2694-E958-7F11-66E3-7A0F76FD3BFD}"/>
+              </a:ext>
+            </a:extLst>
+          </p:cNvPr>
+          <p:cNvGraphicFramePr>
+            <a:graphicFrameLocks noGrp="1"/>
+          </p:cNvGraphicFramePr>
+          <p:nvPr>
+            <p:ph idx="1"/>
+            <p:extLst>
+              <p:ext uri="{D42A27DB-BD31-4B8C-83A1-F6EECF244321}">
                 <p14:modId xmlns:p14="http://schemas.microsoft.com/office/powerpoint/2010/main" val="3082601795"/>
               </p:ext>
             </p:extLst>
@@ -24538,7 +24640,7 @@
 </p:sld>
 </file>
 
-<file path=ppt/slides/slide11.xml><?xml version="1.0" encoding="utf-8"?>
+<file path=ppt/slides/slide12.xml><?xml version="1.0" encoding="utf-8"?>
 <p:sld xmlns:a="http://schemas.openxmlformats.org/drawingml/2006/main" xmlns:r="http://schemas.openxmlformats.org/officeDocument/2006/relationships" xmlns:p="http://schemas.openxmlformats.org/presentationml/2006/main">
   <p:cSld>
     <p:spTree>
@@ -24634,7 +24736,7 @@
 </p:sld>
 </file>
 
-<file path=ppt/slides/slide12.xml><?xml version="1.0" encoding="utf-8"?>
+<file path=ppt/slides/slide13.xml><?xml version="1.0" encoding="utf-8"?>
 <p:sld xmlns:a="http://schemas.openxmlformats.org/drawingml/2006/main" xmlns:r="http://schemas.openxmlformats.org/officeDocument/2006/relationships" xmlns:p="http://schemas.openxmlformats.org/presentationml/2006/main">
   <p:cSld>
     <p:spTree>
@@ -24713,7 +24815,7 @@
 </p:sld>
 </file>
 
-<file path=ppt/slides/slide13.xml><?xml version="1.0" encoding="utf-8"?>
+<file path=ppt/slides/slide14.xml><?xml version="1.0" encoding="utf-8"?>
 <p:sld xmlns:a="http://schemas.openxmlformats.org/drawingml/2006/main" xmlns:r="http://schemas.openxmlformats.org/officeDocument/2006/relationships" xmlns:p="http://schemas.openxmlformats.org/presentationml/2006/main">
   <p:cSld>
     <p:spTree>
@@ -24889,6 +24991,12 @@
             <a:r>
               <a:rPr lang="en-US" dirty="0"/>
               <a:t>Benefits of CI/CD pipelines.</a:t>
+            </a:r>
+          </a:p>
+          <a:p>
+            <a:r>
+              <a:rPr lang="en-US" dirty="0"/>
+              <a:t>Technical Benefits of CI/CD pipelines.</a:t>
             </a:r>
           </a:p>
           <a:p>
@@ -25610,53 +25718,100 @@
           </a:xfrm>
         </p:spPr>
         <p:txBody>
-          <a:bodyPr>
-            <a:normAutofit fontScale="90000"/>
-          </a:bodyPr>
+          <a:bodyPr/>
           <a:lstStyle/>
           <a:p>
             <a:r>
               <a:rPr lang="en-US" dirty="0"/>
-              <a:t>Confronted challenges with automation Powers.</a:t>
+              <a:t>Technical benefits of CI/CD pipelines</a:t>
             </a:r>
           </a:p>
         </p:txBody>
       </p:sp>
-      <p:graphicFrame>
-        <p:nvGraphicFramePr>
-          <p:cNvPr id="4" name="Content Placeholder 3">
+      <p:sp>
+        <p:nvSpPr>
+          <p:cNvPr id="3" name="Content Placeholder 2">
             <a:extLst>
               <a:ext uri="{FF2B5EF4-FFF2-40B4-BE49-F238E27FC236}">
-                <a16:creationId xmlns:a16="http://schemas.microsoft.com/office/drawing/2014/main" id="{1D5C2694-E958-7F11-66E3-7A0F76FD3BFD}"/>
+                <a16:creationId xmlns:a16="http://schemas.microsoft.com/office/drawing/2014/main" id="{C1749B43-2906-4E8A-FE79-7191B6A750EC}"/>
               </a:ext>
             </a:extLst>
           </p:cNvPr>
-          <p:cNvGraphicFramePr>
-            <a:graphicFrameLocks noGrp="1"/>
-          </p:cNvGraphicFramePr>
+          <p:cNvSpPr>
+            <a:spLocks noGrp="1"/>
+          </p:cNvSpPr>
           <p:nvPr>
             <p:ph idx="1"/>
-            <p:extLst>
-              <p:ext uri="{D42A27DB-BD31-4B8C-83A1-F6EECF244321}">
-                <p14:modId xmlns:p14="http://schemas.microsoft.com/office/powerpoint/2010/main" val="3781495727"/>
-              </p:ext>
-            </p:extLst>
           </p:nvPr>
-        </p:nvGraphicFramePr>
-        <p:xfrm>
-          <a:off x="1141413" y="2249488"/>
-          <a:ext cx="9906000" cy="3541712"/>
-        </p:xfrm>
-        <a:graphic>
-          <a:graphicData uri="http://schemas.openxmlformats.org/drawingml/2006/diagram">
-            <dgm:relIds xmlns:dgm="http://schemas.openxmlformats.org/drawingml/2006/diagram" xmlns:r="http://schemas.openxmlformats.org/officeDocument/2006/relationships" r:dm="rId2" r:lo="rId3" r:qs="rId4" r:cs="rId5"/>
-          </a:graphicData>
-        </a:graphic>
-      </p:graphicFrame>
+        </p:nvSpPr>
+        <p:spPr>
+          <a:xfrm>
+            <a:off x="1141412" y="1409075"/>
+            <a:ext cx="9905999" cy="4382126"/>
+          </a:xfrm>
+        </p:spPr>
+        <p:txBody>
+          <a:bodyPr>
+            <a:normAutofit/>
+          </a:bodyPr>
+          <a:lstStyle/>
+          <a:p>
+            <a:pPr marL="0" indent="0">
+              <a:buNone/>
+            </a:pPr>
+            <a:r>
+              <a:rPr lang="en-US" dirty="0"/>
+              <a:t>There are many technical benefits of using CI/CD pipelines which serves (Protecting Revenue - Increasing Revenue - Reducing Cost - Avoiding Cost)</a:t>
+            </a:r>
+          </a:p>
+          <a:p>
+            <a:pPr marL="1035050"/>
+            <a:r>
+              <a:rPr lang="en-US" dirty="0"/>
+              <a:t>Automated Rollback Triggered by Job Failure.</a:t>
+            </a:r>
+          </a:p>
+          <a:p>
+            <a:pPr marL="1035050"/>
+            <a:r>
+              <a:rPr lang="en-US" dirty="0"/>
+              <a:t>Deploy to Production Without Manual Checks.</a:t>
+            </a:r>
+          </a:p>
+          <a:p>
+            <a:pPr marL="1035050"/>
+            <a:r>
+              <a:rPr lang="en-US" dirty="0"/>
+              <a:t>Faster and More Frequent Production Deployments.</a:t>
+            </a:r>
+          </a:p>
+          <a:p>
+            <a:pPr marL="1035050"/>
+            <a:r>
+              <a:rPr lang="en-US" dirty="0"/>
+              <a:t>Automate Infrastructure Cleanup.</a:t>
+            </a:r>
+          </a:p>
+          <a:p>
+            <a:pPr marL="1035050"/>
+            <a:r>
+              <a:rPr lang="en-US" dirty="0"/>
+              <a:t>Detect Security Vulnerabilities.</a:t>
+            </a:r>
+          </a:p>
+          <a:p>
+            <a:pPr marL="1035050"/>
+            <a:r>
+              <a:rPr lang="en-US" dirty="0"/>
+              <a:t>Automate Infrastructure Creation.</a:t>
+            </a:r>
+          </a:p>
+        </p:txBody>
+      </p:sp>
     </p:spTree>
     <p:extLst>
       <p:ext uri="{BB962C8B-B14F-4D97-AF65-F5344CB8AC3E}">
-        <p14:creationId xmlns:p14="http://schemas.microsoft.com/office/powerpoint/2010/main" val="219284453"/>
+        <p14:creationId xmlns:p14="http://schemas.microsoft.com/office/powerpoint/2010/main" val="382987131"/>
       </p:ext>
     </p:extLst>
   </p:cSld>

</xml_diff>